<commit_message>
Fixed some unused variables.
Revised QUICKSTART, Makefiles and configure to take a
path and file argument instead of arch=...

Fixed the HPCG logo to be "High Performance Conjugate Gradients"
(plural).

Updated other files for 2.0 release

git-svn-id: svn+ssh://software.sandia.gov/svn/hpcg/trunk@228 5e06a57e-6b39-4354-92a0-249a7d0c5410
</commit_message>
<xml_diff>
--- a/web/doc/HPCG-Logo.pptx
+++ b/web/doc/HPCG-Logo.pptx
@@ -288,7 +288,7 @@
           <a:p>
             <a:fld id="{745BEBD7-5149-A940-A54A-2621D8695078}" type="datetimeFigureOut">
               <a:rPr lang="en-US" smtClean="0"/>
-              <a:t>9/25/13</a:t>
+              <a:t>1/28/14</a:t>
             </a:fld>
             <a:endParaRPr lang="en-US"/>
           </a:p>
@@ -458,7 +458,7 @@
           <a:p>
             <a:fld id="{745BEBD7-5149-A940-A54A-2621D8695078}" type="datetimeFigureOut">
               <a:rPr lang="en-US" smtClean="0"/>
-              <a:t>9/25/13</a:t>
+              <a:t>1/28/14</a:t>
             </a:fld>
             <a:endParaRPr lang="en-US"/>
           </a:p>
@@ -638,7 +638,7 @@
           <a:p>
             <a:fld id="{745BEBD7-5149-A940-A54A-2621D8695078}" type="datetimeFigureOut">
               <a:rPr lang="en-US" smtClean="0"/>
-              <a:t>9/25/13</a:t>
+              <a:t>1/28/14</a:t>
             </a:fld>
             <a:endParaRPr lang="en-US"/>
           </a:p>
@@ -808,7 +808,7 @@
           <a:p>
             <a:fld id="{745BEBD7-5149-A940-A54A-2621D8695078}" type="datetimeFigureOut">
               <a:rPr lang="en-US" smtClean="0"/>
-              <a:t>9/25/13</a:t>
+              <a:t>1/28/14</a:t>
             </a:fld>
             <a:endParaRPr lang="en-US"/>
           </a:p>
@@ -1054,7 +1054,7 @@
           <a:p>
             <a:fld id="{745BEBD7-5149-A940-A54A-2621D8695078}" type="datetimeFigureOut">
               <a:rPr lang="en-US" smtClean="0"/>
-              <a:t>9/25/13</a:t>
+              <a:t>1/28/14</a:t>
             </a:fld>
             <a:endParaRPr lang="en-US"/>
           </a:p>
@@ -1342,7 +1342,7 @@
           <a:p>
             <a:fld id="{745BEBD7-5149-A940-A54A-2621D8695078}" type="datetimeFigureOut">
               <a:rPr lang="en-US" smtClean="0"/>
-              <a:t>9/25/13</a:t>
+              <a:t>1/28/14</a:t>
             </a:fld>
             <a:endParaRPr lang="en-US"/>
           </a:p>
@@ -1764,7 +1764,7 @@
           <a:p>
             <a:fld id="{745BEBD7-5149-A940-A54A-2621D8695078}" type="datetimeFigureOut">
               <a:rPr lang="en-US" smtClean="0"/>
-              <a:t>9/25/13</a:t>
+              <a:t>1/28/14</a:t>
             </a:fld>
             <a:endParaRPr lang="en-US"/>
           </a:p>
@@ -1882,7 +1882,7 @@
           <a:p>
             <a:fld id="{745BEBD7-5149-A940-A54A-2621D8695078}" type="datetimeFigureOut">
               <a:rPr lang="en-US" smtClean="0"/>
-              <a:t>9/25/13</a:t>
+              <a:t>1/28/14</a:t>
             </a:fld>
             <a:endParaRPr lang="en-US"/>
           </a:p>
@@ -1977,7 +1977,7 @@
           <a:p>
             <a:fld id="{745BEBD7-5149-A940-A54A-2621D8695078}" type="datetimeFigureOut">
               <a:rPr lang="en-US" smtClean="0"/>
-              <a:t>9/25/13</a:t>
+              <a:t>1/28/14</a:t>
             </a:fld>
             <a:endParaRPr lang="en-US"/>
           </a:p>
@@ -2254,7 +2254,7 @@
           <a:p>
             <a:fld id="{745BEBD7-5149-A940-A54A-2621D8695078}" type="datetimeFigureOut">
               <a:rPr lang="en-US" smtClean="0"/>
-              <a:t>9/25/13</a:t>
+              <a:t>1/28/14</a:t>
             </a:fld>
             <a:endParaRPr lang="en-US"/>
           </a:p>
@@ -2507,7 +2507,7 @@
           <a:p>
             <a:fld id="{745BEBD7-5149-A940-A54A-2621D8695078}" type="datetimeFigureOut">
               <a:rPr lang="en-US" smtClean="0"/>
-              <a:t>9/25/13</a:t>
+              <a:t>1/28/14</a:t>
             </a:fld>
             <a:endParaRPr lang="en-US"/>
           </a:p>
@@ -2720,7 +2720,7 @@
           <a:p>
             <a:fld id="{745BEBD7-5149-A940-A54A-2621D8695078}" type="datetimeFigureOut">
               <a:rPr lang="en-US" smtClean="0"/>
-              <a:t>9/25/13</a:t>
+              <a:t>1/28/14</a:t>
             </a:fld>
             <a:endParaRPr lang="en-US"/>
           </a:p>
@@ -3103,8 +3103,8 @@
         </p:nvSpPr>
         <p:spPr>
           <a:xfrm>
-            <a:off x="3811285" y="2883290"/>
-            <a:ext cx="2156397" cy="1107996"/>
+            <a:off x="3721661" y="2806142"/>
+            <a:ext cx="2335645" cy="1200329"/>
           </a:xfrm>
           <a:prstGeom prst="rect">
             <a:avLst/>
@@ -3119,7 +3119,7 @@
           <a:p>
             <a:pPr algn="ctr"/>
             <a:r>
-              <a:rPr lang="en-US" sz="6600" b="1" cap="none" spc="0" dirty="0" smtClean="0">
+              <a:rPr lang="en-US" sz="7200" b="1" cap="none" spc="0" dirty="0" smtClean="0">
                 <a:ln w="12700">
                   <a:solidFill>
                     <a:schemeClr val="tx2">
@@ -3144,7 +3144,7 @@
               </a:rPr>
               <a:t>HPCG</a:t>
             </a:r>
-            <a:endParaRPr lang="en-US" sz="6600" b="1" cap="none" spc="0" dirty="0">
+            <a:endParaRPr lang="en-US" sz="7200" b="1" cap="none" spc="0" dirty="0">
               <a:ln w="12700">
                 <a:solidFill>
                   <a:schemeClr val="tx2">
@@ -3178,8 +3178,8 @@
         </p:nvSpPr>
         <p:spPr>
           <a:xfrm>
-            <a:off x="3829961" y="3759860"/>
-            <a:ext cx="2172390" cy="246221"/>
+            <a:off x="3804563" y="3759860"/>
+            <a:ext cx="2222358" cy="246221"/>
           </a:xfrm>
           <a:prstGeom prst="rect">
             <a:avLst/>
@@ -3194,7 +3194,11 @@
           <a:p>
             <a:r>
               <a:rPr lang="en-US" sz="1000" dirty="0" smtClean="0"/>
-              <a:t>High Performance Conjugate Gradient</a:t>
+              <a:t>High Performance Conjugate </a:t>
+            </a:r>
+            <a:r>
+              <a:rPr lang="en-US" sz="1000" dirty="0" smtClean="0"/>
+              <a:t>Gradients</a:t>
             </a:r>
             <a:endParaRPr lang="en-US" sz="1000" dirty="0"/>
           </a:p>

</xml_diff>